<commit_message>
cleaned new figs and old
</commit_message>
<xml_diff>
--- a/Fig3.pptx
+++ b/Fig3.pptx
@@ -107,6 +107,11 @@
       </a:defRPr>
     </a:lvl9pPr>
   </p:defaultTextStyle>
+  <p:extLst>
+    <p:ext uri="{EFAFB233-063F-42B5-8137-9DF3F51BA10A}">
+      <p15:sldGuideLst xmlns:p15="http://schemas.microsoft.com/office/powerpoint/2012/main"/>
+    </p:ext>
+  </p:extLst>
 </p:presentation>
 </file>
 
@@ -192,7 +197,7 @@
           <a:p>
             <a:fld id="{D85B323C-C696-154B-87AD-62FD93C73074}" type="datetimeFigureOut">
               <a:rPr lang="en-US" smtClean="0"/>
-              <a:t>4/7/22</a:t>
+              <a:t>4/8/22</a:t>
             </a:fld>
             <a:endParaRPr lang="en-US"/>
           </a:p>
@@ -690,7 +695,7 @@
           <a:p>
             <a:fld id="{42C0DF03-A4DB-054C-964F-7D0763045C3A}" type="datetimeFigureOut">
               <a:rPr lang="en-US" smtClean="0"/>
-              <a:t>4/7/22</a:t>
+              <a:t>4/8/22</a:t>
             </a:fld>
             <a:endParaRPr lang="en-US"/>
           </a:p>
@@ -888,7 +893,7 @@
           <a:p>
             <a:fld id="{42C0DF03-A4DB-054C-964F-7D0763045C3A}" type="datetimeFigureOut">
               <a:rPr lang="en-US" smtClean="0"/>
-              <a:t>4/7/22</a:t>
+              <a:t>4/8/22</a:t>
             </a:fld>
             <a:endParaRPr lang="en-US"/>
           </a:p>
@@ -1096,7 +1101,7 @@
           <a:p>
             <a:fld id="{42C0DF03-A4DB-054C-964F-7D0763045C3A}" type="datetimeFigureOut">
               <a:rPr lang="en-US" smtClean="0"/>
-              <a:t>4/7/22</a:t>
+              <a:t>4/8/22</a:t>
             </a:fld>
             <a:endParaRPr lang="en-US"/>
           </a:p>
@@ -1294,7 +1299,7 @@
           <a:p>
             <a:fld id="{42C0DF03-A4DB-054C-964F-7D0763045C3A}" type="datetimeFigureOut">
               <a:rPr lang="en-US" smtClean="0"/>
-              <a:t>4/7/22</a:t>
+              <a:t>4/8/22</a:t>
             </a:fld>
             <a:endParaRPr lang="en-US"/>
           </a:p>
@@ -1569,7 +1574,7 @@
           <a:p>
             <a:fld id="{42C0DF03-A4DB-054C-964F-7D0763045C3A}" type="datetimeFigureOut">
               <a:rPr lang="en-US" smtClean="0"/>
-              <a:t>4/7/22</a:t>
+              <a:t>4/8/22</a:t>
             </a:fld>
             <a:endParaRPr lang="en-US"/>
           </a:p>
@@ -1834,7 +1839,7 @@
           <a:p>
             <a:fld id="{42C0DF03-A4DB-054C-964F-7D0763045C3A}" type="datetimeFigureOut">
               <a:rPr lang="en-US" smtClean="0"/>
-              <a:t>4/7/22</a:t>
+              <a:t>4/8/22</a:t>
             </a:fld>
             <a:endParaRPr lang="en-US"/>
           </a:p>
@@ -2246,7 +2251,7 @@
           <a:p>
             <a:fld id="{42C0DF03-A4DB-054C-964F-7D0763045C3A}" type="datetimeFigureOut">
               <a:rPr lang="en-US" smtClean="0"/>
-              <a:t>4/7/22</a:t>
+              <a:t>4/8/22</a:t>
             </a:fld>
             <a:endParaRPr lang="en-US"/>
           </a:p>
@@ -2387,7 +2392,7 @@
           <a:p>
             <a:fld id="{42C0DF03-A4DB-054C-964F-7D0763045C3A}" type="datetimeFigureOut">
               <a:rPr lang="en-US" smtClean="0"/>
-              <a:t>4/7/22</a:t>
+              <a:t>4/8/22</a:t>
             </a:fld>
             <a:endParaRPr lang="en-US"/>
           </a:p>
@@ -2500,7 +2505,7 @@
           <a:p>
             <a:fld id="{42C0DF03-A4DB-054C-964F-7D0763045C3A}" type="datetimeFigureOut">
               <a:rPr lang="en-US" smtClean="0"/>
-              <a:t>4/7/22</a:t>
+              <a:t>4/8/22</a:t>
             </a:fld>
             <a:endParaRPr lang="en-US"/>
           </a:p>
@@ -2811,7 +2816,7 @@
           <a:p>
             <a:fld id="{42C0DF03-A4DB-054C-964F-7D0763045C3A}" type="datetimeFigureOut">
               <a:rPr lang="en-US" smtClean="0"/>
-              <a:t>4/7/22</a:t>
+              <a:t>4/8/22</a:t>
             </a:fld>
             <a:endParaRPr lang="en-US"/>
           </a:p>
@@ -3099,7 +3104,7 @@
           <a:p>
             <a:fld id="{42C0DF03-A4DB-054C-964F-7D0763045C3A}" type="datetimeFigureOut">
               <a:rPr lang="en-US" smtClean="0"/>
-              <a:t>4/7/22</a:t>
+              <a:t>4/8/22</a:t>
             </a:fld>
             <a:endParaRPr lang="en-US"/>
           </a:p>
@@ -3340,7 +3345,7 @@
           <a:p>
             <a:fld id="{42C0DF03-A4DB-054C-964F-7D0763045C3A}" type="datetimeFigureOut">
               <a:rPr lang="en-US" smtClean="0"/>
-              <a:t>4/7/22</a:t>
+              <a:t>4/8/22</a:t>
             </a:fld>
             <a:endParaRPr lang="en-US"/>
           </a:p>
@@ -3759,10 +3764,10 @@
       </p:grpSpPr>
       <p:pic>
         <p:nvPicPr>
-          <p:cNvPr id="7" name="Picture 6">
-            <a:extLst>
-              <a:ext uri="{FF2B5EF4-FFF2-40B4-BE49-F238E27FC236}">
-                <a16:creationId xmlns:a16="http://schemas.microsoft.com/office/drawing/2014/main" id="{7FB74C30-D21F-A34D-9573-ABB8C8805178}"/>
+          <p:cNvPr id="3" name="Picture 2">
+            <a:extLst>
+              <a:ext uri="{FF2B5EF4-FFF2-40B4-BE49-F238E27FC236}">
+                <a16:creationId xmlns:a16="http://schemas.microsoft.com/office/drawing/2014/main" id="{B561E871-0537-9743-AB9E-50DB7C46547B}"/>
               </a:ext>
             </a:extLst>
           </p:cNvPr>
@@ -3779,8 +3784,8 @@
         </p:blipFill>
         <p:spPr>
           <a:xfrm>
-            <a:off x="3724275" y="0"/>
-            <a:ext cx="5143500" cy="6858000"/>
+            <a:off x="4248237" y="-1"/>
+            <a:ext cx="4575927" cy="6863891"/>
           </a:xfrm>
           <a:prstGeom prst="rect">
             <a:avLst/>
@@ -3801,7 +3806,7 @@
         </p:nvSpPr>
         <p:spPr>
           <a:xfrm rot="5400000">
-            <a:off x="5672144" y="3176703"/>
+            <a:off x="5621706" y="3184905"/>
             <a:ext cx="6583853" cy="276999"/>
           </a:xfrm>
           <a:prstGeom prst="rect">
@@ -3844,7 +3849,7 @@
         </p:nvCxnSpPr>
         <p:spPr>
           <a:xfrm>
-            <a:off x="8825571" y="1562943"/>
+            <a:off x="8775133" y="1571145"/>
             <a:ext cx="275982" cy="0"/>
           </a:xfrm>
           <a:prstGeom prst="line">
@@ -3885,7 +3890,7 @@
         </p:nvCxnSpPr>
         <p:spPr>
           <a:xfrm>
-            <a:off x="8825571" y="3277443"/>
+            <a:off x="8775133" y="3285645"/>
             <a:ext cx="275982" cy="0"/>
           </a:xfrm>
           <a:prstGeom prst="line">
@@ -3928,7 +3933,7 @@
         </p:nvCxnSpPr>
         <p:spPr>
           <a:xfrm>
-            <a:off x="8825571" y="4991943"/>
+            <a:off x="8775133" y="5000145"/>
             <a:ext cx="282332" cy="0"/>
           </a:xfrm>
           <a:prstGeom prst="line">

</xml_diff>